<commit_message>
other updates on the ppt
</commit_message>
<xml_diff>
--- a/presentation/HDA 2018.pptx
+++ b/presentation/HDA 2018.pptx
@@ -6,7 +6,7 @@
     <p:sldMasterId id="2147483688" r:id="rId2"/>
   </p:sldMasterIdLst>
   <p:notesMasterIdLst>
-    <p:notesMasterId r:id="rId11"/>
+    <p:notesMasterId r:id="rId12"/>
   </p:notesMasterIdLst>
   <p:sldIdLst>
     <p:sldId id="285" r:id="rId3"/>
@@ -15,8 +15,9 @@
     <p:sldId id="403" r:id="rId6"/>
     <p:sldId id="404" r:id="rId7"/>
     <p:sldId id="405" r:id="rId8"/>
-    <p:sldId id="383" r:id="rId9"/>
-    <p:sldId id="401" r:id="rId10"/>
+    <p:sldId id="407" r:id="rId9"/>
+    <p:sldId id="383" r:id="rId10"/>
+    <p:sldId id="406" r:id="rId11"/>
   </p:sldIdLst>
   <p:sldSz cx="9144000" cy="6858000" type="screen4x3"/>
   <p:notesSz cx="6858000" cy="9144000"/>
@@ -650,7 +651,7 @@
           <a:p>
             <a:fld id="{043C84D1-19FD-4492-8382-9D79A275F182}" type="slidenum">
               <a:rPr lang="it-IT" smtClean="0"/>
-              <a:t>8</a:t>
+              <a:t>9</a:t>
             </a:fld>
             <a:endParaRPr lang="it-IT"/>
           </a:p>
@@ -659,7 +660,7 @@
     </p:spTree>
     <p:extLst>
       <p:ext uri="{BB962C8B-B14F-4D97-AF65-F5344CB8AC3E}">
-        <p14:creationId xmlns:p14="http://schemas.microsoft.com/office/powerpoint/2010/main" val="2977223332"/>
+        <p14:creationId xmlns:p14="http://schemas.microsoft.com/office/powerpoint/2010/main" val="2340119099"/>
       </p:ext>
     </p:extLst>
   </p:cSld>
@@ -6564,7 +6565,6 @@
                     </a:srgbClr>
                   </a:outerShdw>
                 </a:effectLst>
-                <a:latin typeface="+mn-lt"/>
                 <a:ea typeface="Fira Sans" charset="0"/>
                 <a:cs typeface="Fira Sans" charset="0"/>
               </a:rPr>
@@ -7125,15 +7125,21 @@
               <a:buNone/>
             </a:pPr>
             <a:r>
-              <a:rPr lang="it-IT" dirty="0"/>
+              <a:rPr lang="it-IT" dirty="0">
+                <a:latin typeface="+mj-lt"/>
+              </a:rPr>
               <a:t>Human Activity </a:t>
             </a:r>
             <a:r>
-              <a:rPr lang="it-IT" dirty="0" err="1"/>
+              <a:rPr lang="it-IT" dirty="0" err="1">
+                <a:latin typeface="+mj-lt"/>
+              </a:rPr>
               <a:t>Recognition</a:t>
             </a:r>
             <a:r>
-              <a:rPr lang="it-IT" dirty="0"/>
+              <a:rPr lang="it-IT" dirty="0">
+                <a:latin typeface="+mj-lt"/>
+              </a:rPr>
               <a:t>: </a:t>
             </a:r>
           </a:p>
@@ -7166,15 +7172,21 @@
               <a:buChar char="•"/>
             </a:pPr>
             <a:r>
-              <a:rPr lang="it-IT" sz="2400" dirty="0"/>
+              <a:rPr lang="it-IT" sz="2400" dirty="0">
+                <a:latin typeface="+mj-lt"/>
+              </a:rPr>
               <a:t>Visual </a:t>
             </a:r>
             <a:r>
-              <a:rPr lang="it-IT" sz="2400" dirty="0" err="1"/>
+              <a:rPr lang="it-IT" sz="2400" dirty="0" err="1">
+                <a:latin typeface="+mj-lt"/>
+              </a:rPr>
               <a:t>detection</a:t>
             </a:r>
             <a:r>
-              <a:rPr lang="it-IT" sz="2400" dirty="0"/>
+              <a:rPr lang="it-IT" sz="2400" dirty="0">
+                <a:latin typeface="+mj-lt"/>
+              </a:rPr>
               <a:t> from images and video</a:t>
             </a:r>
           </a:p>
@@ -7184,27 +7196,39 @@
               <a:buChar char="•"/>
             </a:pPr>
             <a:r>
-              <a:rPr lang="it-IT" sz="2400" dirty="0" err="1"/>
+              <a:rPr lang="it-IT" sz="2400" dirty="0" err="1">
+                <a:latin typeface="+mj-lt"/>
+              </a:rPr>
               <a:t>Gesture</a:t>
             </a:r>
             <a:r>
-              <a:rPr lang="it-IT" sz="2400" dirty="0"/>
+              <a:rPr lang="it-IT" sz="2400" dirty="0">
+                <a:latin typeface="+mj-lt"/>
+              </a:rPr>
               <a:t> </a:t>
             </a:r>
             <a:r>
-              <a:rPr lang="it-IT" sz="2400" dirty="0" err="1"/>
+              <a:rPr lang="it-IT" sz="2400" dirty="0" err="1">
+                <a:latin typeface="+mj-lt"/>
+              </a:rPr>
               <a:t>recognition</a:t>
             </a:r>
             <a:r>
-              <a:rPr lang="it-IT" sz="2400" dirty="0"/>
+              <a:rPr lang="it-IT" sz="2400" dirty="0">
+                <a:latin typeface="+mj-lt"/>
+              </a:rPr>
               <a:t> from </a:t>
             </a:r>
             <a:r>
-              <a:rPr lang="it-IT" sz="2400" dirty="0" err="1"/>
+              <a:rPr lang="it-IT" sz="2400" dirty="0" err="1">
+                <a:latin typeface="+mj-lt"/>
+              </a:rPr>
               <a:t>sensor-based</a:t>
             </a:r>
             <a:r>
-              <a:rPr lang="it-IT" sz="2400" dirty="0"/>
+              <a:rPr lang="it-IT" sz="2400" dirty="0">
+                <a:latin typeface="+mj-lt"/>
+              </a:rPr>
               <a:t> data</a:t>
             </a:r>
           </a:p>
@@ -7213,7 +7237,9 @@
               <a:buFont typeface="Arial" panose="020B0604020202020204" pitchFamily="34" charset="0"/>
               <a:buChar char="•"/>
             </a:pPr>
-            <a:endParaRPr lang="it-IT" dirty="0"/>
+            <a:endParaRPr lang="it-IT" dirty="0">
+              <a:latin typeface="+mj-lt"/>
+            </a:endParaRPr>
           </a:p>
         </p:txBody>
       </p:sp>
@@ -7283,92 +7309,136 @@
           <a:lstStyle/>
           <a:p>
             <a:r>
-              <a:rPr lang="it-IT" sz="2400" dirty="0"/>
+              <a:rPr lang="it-IT" sz="2400" dirty="0">
+                <a:latin typeface="+mj-lt"/>
+              </a:rPr>
               <a:t>In the </a:t>
             </a:r>
             <a:r>
-              <a:rPr lang="it-IT" sz="2400" dirty="0" err="1"/>
+              <a:rPr lang="it-IT" sz="2400" dirty="0" err="1">
+                <a:latin typeface="+mj-lt"/>
+              </a:rPr>
               <a:t>past</a:t>
             </a:r>
             <a:r>
-              <a:rPr lang="it-IT" sz="2400" dirty="0"/>
+              <a:rPr lang="it-IT" sz="2400" dirty="0">
+                <a:latin typeface="+mj-lt"/>
+              </a:rPr>
               <a:t> decade, </a:t>
             </a:r>
             <a:r>
-              <a:rPr lang="it-IT" sz="2400" dirty="0" err="1"/>
+              <a:rPr lang="it-IT" sz="2400" dirty="0" err="1">
+                <a:latin typeface="+mj-lt"/>
+              </a:rPr>
               <a:t>many</a:t>
             </a:r>
             <a:r>
-              <a:rPr lang="it-IT" sz="2400" dirty="0"/>
+              <a:rPr lang="it-IT" sz="2400" dirty="0">
+                <a:latin typeface="+mj-lt"/>
+              </a:rPr>
               <a:t> </a:t>
             </a:r>
             <a:r>
-              <a:rPr lang="it-IT" sz="2400" dirty="0" err="1"/>
+              <a:rPr lang="it-IT" sz="2400" dirty="0" err="1">
+                <a:latin typeface="+mj-lt"/>
+              </a:rPr>
               <a:t>models</a:t>
             </a:r>
             <a:r>
-              <a:rPr lang="it-IT" sz="2400" dirty="0"/>
+              <a:rPr lang="it-IT" sz="2400" dirty="0">
+                <a:latin typeface="+mj-lt"/>
+              </a:rPr>
               <a:t> </a:t>
             </a:r>
             <a:r>
-              <a:rPr lang="it-IT" sz="2400" dirty="0" err="1"/>
+              <a:rPr lang="it-IT" sz="2400" dirty="0" err="1">
+                <a:latin typeface="+mj-lt"/>
+              </a:rPr>
               <a:t>have</a:t>
             </a:r>
             <a:r>
-              <a:rPr lang="it-IT" sz="2400" dirty="0"/>
+              <a:rPr lang="it-IT" sz="2400" dirty="0">
+                <a:latin typeface="+mj-lt"/>
+              </a:rPr>
               <a:t> </a:t>
             </a:r>
             <a:r>
-              <a:rPr lang="it-IT" sz="2400" dirty="0" err="1"/>
+              <a:rPr lang="it-IT" sz="2400" dirty="0" err="1">
+                <a:latin typeface="+mj-lt"/>
+              </a:rPr>
               <a:t>been</a:t>
             </a:r>
             <a:r>
-              <a:rPr lang="it-IT" sz="2400" dirty="0"/>
+              <a:rPr lang="it-IT" sz="2400" dirty="0">
+                <a:latin typeface="+mj-lt"/>
+              </a:rPr>
               <a:t> </a:t>
             </a:r>
             <a:r>
-              <a:rPr lang="it-IT" sz="2400" dirty="0" err="1"/>
+              <a:rPr lang="it-IT" sz="2400" dirty="0" err="1">
+                <a:latin typeface="+mj-lt"/>
+              </a:rPr>
               <a:t>designed</a:t>
             </a:r>
             <a:r>
-              <a:rPr lang="it-IT" sz="2400" dirty="0"/>
+              <a:rPr lang="it-IT" sz="2400" dirty="0">
+                <a:latin typeface="+mj-lt"/>
+              </a:rPr>
               <a:t> for time </a:t>
             </a:r>
             <a:r>
-              <a:rPr lang="it-IT" sz="2400" dirty="0" err="1"/>
+              <a:rPr lang="it-IT" sz="2400" dirty="0" err="1">
+                <a:latin typeface="+mj-lt"/>
+              </a:rPr>
               <a:t>series</a:t>
             </a:r>
             <a:r>
-              <a:rPr lang="it-IT" sz="2400" dirty="0"/>
+              <a:rPr lang="it-IT" sz="2400" dirty="0">
+                <a:latin typeface="+mj-lt"/>
+              </a:rPr>
               <a:t> </a:t>
             </a:r>
             <a:r>
-              <a:rPr lang="it-IT" sz="2400" dirty="0" err="1"/>
+              <a:rPr lang="it-IT" sz="2400" dirty="0" err="1">
+                <a:latin typeface="+mj-lt"/>
+              </a:rPr>
               <a:t>classification</a:t>
             </a:r>
             <a:r>
-              <a:rPr lang="it-IT" sz="2400" dirty="0"/>
+              <a:rPr lang="it-IT" sz="2400" dirty="0">
+                <a:latin typeface="+mj-lt"/>
+              </a:rPr>
               <a:t>.</a:t>
             </a:r>
           </a:p>
           <a:p>
-            <a:endParaRPr lang="it-IT" sz="2400" dirty="0"/>
-          </a:p>
-          <a:p>
-            <a:r>
-              <a:rPr lang="it-IT" sz="2400" dirty="0" err="1"/>
+            <a:endParaRPr lang="it-IT" sz="2400" dirty="0">
+              <a:latin typeface="+mj-lt"/>
+            </a:endParaRPr>
+          </a:p>
+          <a:p>
+            <a:r>
+              <a:rPr lang="it-IT" sz="2400" dirty="0" err="1">
+                <a:latin typeface="+mj-lt"/>
+              </a:rPr>
               <a:t>Main</a:t>
             </a:r>
             <a:r>
-              <a:rPr lang="it-IT" sz="2400" dirty="0"/>
+              <a:rPr lang="it-IT" sz="2400" dirty="0">
+                <a:latin typeface="+mj-lt"/>
+              </a:rPr>
               <a:t> </a:t>
             </a:r>
             <a:r>
-              <a:rPr lang="it-IT" sz="2400" dirty="0" err="1"/>
+              <a:rPr lang="it-IT" sz="2400" dirty="0" err="1">
+                <a:latin typeface="+mj-lt"/>
+              </a:rPr>
               <a:t>problem</a:t>
             </a:r>
             <a:r>
-              <a:rPr lang="it-IT" sz="2400" dirty="0"/>
+              <a:rPr lang="it-IT" sz="2400" dirty="0">
+                <a:latin typeface="+mj-lt"/>
+              </a:rPr>
               <a:t>: </a:t>
             </a:r>
           </a:p>
@@ -7382,26 +7452,37 @@
                 <a:solidFill>
                   <a:srgbClr val="FF0000"/>
                 </a:solidFill>
+                <a:latin typeface="+mj-lt"/>
               </a:rPr>
               <a:t>LACK of  BENCHMARKING DATASET</a:t>
             </a:r>
             <a:r>
-              <a:rPr lang="it-IT" sz="2400" dirty="0"/>
+              <a:rPr lang="it-IT" sz="2400" dirty="0">
+                <a:latin typeface="+mj-lt"/>
+              </a:rPr>
               <a:t> to compare </a:t>
             </a:r>
             <a:r>
-              <a:rPr lang="it-IT" sz="2400" dirty="0" err="1"/>
+              <a:rPr lang="it-IT" sz="2400" dirty="0" err="1">
+                <a:latin typeface="+mj-lt"/>
+              </a:rPr>
               <a:t>different</a:t>
             </a:r>
             <a:r>
-              <a:rPr lang="it-IT" sz="2400" dirty="0"/>
+              <a:rPr lang="it-IT" sz="2400" dirty="0">
+                <a:latin typeface="+mj-lt"/>
+              </a:rPr>
               <a:t> </a:t>
             </a:r>
             <a:r>
-              <a:rPr lang="it-IT" sz="2400" dirty="0" err="1"/>
+              <a:rPr lang="it-IT" sz="2400" dirty="0" err="1">
+                <a:latin typeface="+mj-lt"/>
+              </a:rPr>
               <a:t>solutions</a:t>
             </a:r>
-            <a:endParaRPr lang="it-IT" sz="2400" dirty="0"/>
+            <a:endParaRPr lang="it-IT" sz="2400" dirty="0">
+              <a:latin typeface="+mj-lt"/>
+            </a:endParaRPr>
           </a:p>
           <a:p>
             <a:pPr marL="342900" indent="-342900">
@@ -7413,46 +7494,67 @@
                 <a:solidFill>
                   <a:srgbClr val="FF0000"/>
                 </a:solidFill>
+                <a:latin typeface="+mj-lt"/>
               </a:rPr>
               <a:t>ABSENCE of DETAILS</a:t>
             </a:r>
             <a:r>
-              <a:rPr lang="it-IT" sz="2400" b="1" dirty="0"/>
+              <a:rPr lang="it-IT" sz="2400" b="1" dirty="0">
+                <a:latin typeface="+mj-lt"/>
+              </a:rPr>
               <a:t> </a:t>
             </a:r>
             <a:r>
-              <a:rPr lang="it-IT" sz="2400" dirty="0"/>
+              <a:rPr lang="it-IT" sz="2400" dirty="0">
+                <a:latin typeface="+mj-lt"/>
+              </a:rPr>
               <a:t>in </a:t>
             </a:r>
             <a:r>
-              <a:rPr lang="it-IT" sz="2400" dirty="0" err="1"/>
+              <a:rPr lang="it-IT" sz="2400" dirty="0" err="1">
+                <a:latin typeface="+mj-lt"/>
+              </a:rPr>
               <a:t>most</a:t>
             </a:r>
             <a:r>
-              <a:rPr lang="it-IT" sz="2400" dirty="0"/>
+              <a:rPr lang="it-IT" sz="2400" dirty="0">
+                <a:latin typeface="+mj-lt"/>
+              </a:rPr>
               <a:t> of the </a:t>
             </a:r>
             <a:r>
-              <a:rPr lang="it-IT" sz="2400" dirty="0" err="1"/>
+              <a:rPr lang="it-IT" sz="2400" dirty="0" err="1">
+                <a:latin typeface="+mj-lt"/>
+              </a:rPr>
               <a:t>models</a:t>
             </a:r>
             <a:r>
-              <a:rPr lang="it-IT" sz="2400" dirty="0"/>
+              <a:rPr lang="it-IT" sz="2400" dirty="0">
+                <a:latin typeface="+mj-lt"/>
+              </a:rPr>
               <a:t> </a:t>
             </a:r>
             <a:r>
-              <a:rPr lang="it-IT" sz="2400" dirty="0" err="1"/>
+              <a:rPr lang="it-IT" sz="2400" dirty="0" err="1">
+                <a:latin typeface="+mj-lt"/>
+              </a:rPr>
               <a:t>presented</a:t>
             </a:r>
             <a:r>
-              <a:rPr lang="it-IT" sz="2400" dirty="0"/>
+              <a:rPr lang="it-IT" sz="2400" dirty="0">
+                <a:latin typeface="+mj-lt"/>
+              </a:rPr>
               <a:t> in the </a:t>
             </a:r>
             <a:r>
-              <a:rPr lang="it-IT" sz="2400" dirty="0" err="1"/>
+              <a:rPr lang="it-IT" sz="2400" dirty="0" err="1">
+                <a:latin typeface="+mj-lt"/>
+              </a:rPr>
               <a:t>literature</a:t>
             </a:r>
-            <a:endParaRPr lang="it-IT" sz="2400" dirty="0"/>
+            <a:endParaRPr lang="it-IT" sz="2400" dirty="0">
+              <a:latin typeface="+mj-lt"/>
+            </a:endParaRPr>
           </a:p>
         </p:txBody>
       </p:sp>
@@ -7568,87 +7670,129 @@
           <a:lstStyle/>
           <a:p>
             <a:r>
-              <a:rPr lang="it-IT" sz="1400" dirty="0"/>
+              <a:rPr lang="it-IT" sz="1400" dirty="0">
+                <a:latin typeface="+mj-lt"/>
+              </a:rPr>
               <a:t>[1] R. </a:t>
             </a:r>
             <a:r>
-              <a:rPr lang="it-IT" sz="1400" dirty="0" err="1"/>
+              <a:rPr lang="it-IT" sz="1400" dirty="0" err="1">
+                <a:latin typeface="+mj-lt"/>
+              </a:rPr>
               <a:t>Chavarriaga</a:t>
             </a:r>
             <a:r>
-              <a:rPr lang="it-IT" sz="1400" dirty="0"/>
+              <a:rPr lang="it-IT" sz="1400" dirty="0">
+                <a:latin typeface="+mj-lt"/>
+              </a:rPr>
               <a:t>, H. </a:t>
             </a:r>
             <a:r>
-              <a:rPr lang="it-IT" sz="1400" dirty="0" err="1"/>
+              <a:rPr lang="it-IT" sz="1400" dirty="0" err="1">
+                <a:latin typeface="+mj-lt"/>
+              </a:rPr>
               <a:t>Sagha</a:t>
             </a:r>
             <a:r>
-              <a:rPr lang="it-IT" sz="1400" dirty="0"/>
+              <a:rPr lang="it-IT" sz="1400" dirty="0">
+                <a:latin typeface="+mj-lt"/>
+              </a:rPr>
               <a:t>, A. </a:t>
             </a:r>
             <a:r>
-              <a:rPr lang="it-IT" sz="1400" dirty="0" err="1"/>
+              <a:rPr lang="it-IT" sz="1400" dirty="0" err="1">
+                <a:latin typeface="+mj-lt"/>
+              </a:rPr>
               <a:t>Calatroni</a:t>
             </a:r>
             <a:r>
-              <a:rPr lang="it-IT" sz="1400" dirty="0"/>
+              <a:rPr lang="it-IT" sz="1400" dirty="0">
+                <a:latin typeface="+mj-lt"/>
+              </a:rPr>
               <a:t>, S. T. </a:t>
             </a:r>
             <a:r>
-              <a:rPr lang="it-IT" sz="1400" dirty="0" err="1"/>
+              <a:rPr lang="it-IT" sz="1400" dirty="0" err="1">
+                <a:latin typeface="+mj-lt"/>
+              </a:rPr>
               <a:t>Digumarti</a:t>
             </a:r>
             <a:r>
-              <a:rPr lang="it-IT" sz="1400" dirty="0"/>
+              <a:rPr lang="it-IT" sz="1400" dirty="0">
+                <a:latin typeface="+mj-lt"/>
+              </a:rPr>
               <a:t>, G. </a:t>
             </a:r>
             <a:r>
-              <a:rPr lang="it-IT" sz="1400" dirty="0" err="1"/>
+              <a:rPr lang="it-IT" sz="1400" dirty="0" err="1">
+                <a:latin typeface="+mj-lt"/>
+              </a:rPr>
               <a:t>Tröster</a:t>
             </a:r>
             <a:r>
-              <a:rPr lang="it-IT" sz="1400" dirty="0"/>
+              <a:rPr lang="it-IT" sz="1400" dirty="0">
+                <a:latin typeface="+mj-lt"/>
+              </a:rPr>
               <a:t>, </a:t>
             </a:r>
             <a:r>
-              <a:rPr lang="en-US" sz="1400" dirty="0"/>
+              <a:rPr lang="en-US" sz="1400" dirty="0">
+                <a:latin typeface="+mj-lt"/>
+              </a:rPr>
               <a:t>J. del R. </a:t>
             </a:r>
             <a:r>
-              <a:rPr lang="en-US" sz="1400" dirty="0" err="1"/>
+              <a:rPr lang="en-US" sz="1400" dirty="0" err="1">
+                <a:latin typeface="+mj-lt"/>
+              </a:rPr>
               <a:t>Millán</a:t>
             </a:r>
             <a:r>
-              <a:rPr lang="en-US" sz="1400" dirty="0"/>
+              <a:rPr lang="en-US" sz="1400" dirty="0">
+                <a:latin typeface="+mj-lt"/>
+              </a:rPr>
               <a:t>, and D. </a:t>
             </a:r>
             <a:r>
-              <a:rPr lang="en-US" sz="1400" dirty="0" err="1"/>
+              <a:rPr lang="en-US" sz="1400" dirty="0" err="1">
+                <a:latin typeface="+mj-lt"/>
+              </a:rPr>
               <a:t>Roggen</a:t>
             </a:r>
             <a:r>
-              <a:rPr lang="en-US" sz="1400" dirty="0"/>
+              <a:rPr lang="en-US" sz="1400" dirty="0">
+                <a:latin typeface="+mj-lt"/>
+              </a:rPr>
               <a:t>, “The opportunity challenge: A benchmark database for on-body sensor-based activity recognition,” </a:t>
             </a:r>
             <a:r>
-              <a:rPr lang="it-IT" sz="1400" i="1" dirty="0"/>
+              <a:rPr lang="it-IT" sz="1400" i="1" dirty="0">
+                <a:latin typeface="+mj-lt"/>
+              </a:rPr>
               <a:t>Pattern </a:t>
             </a:r>
             <a:r>
-              <a:rPr lang="it-IT" sz="1400" i="1" dirty="0" err="1"/>
+              <a:rPr lang="it-IT" sz="1400" i="1" dirty="0" err="1">
+                <a:latin typeface="+mj-lt"/>
+              </a:rPr>
               <a:t>Recognition</a:t>
             </a:r>
             <a:r>
-              <a:rPr lang="it-IT" sz="1400" i="1" dirty="0"/>
+              <a:rPr lang="it-IT" sz="1400" i="1" dirty="0">
+                <a:latin typeface="+mj-lt"/>
+              </a:rPr>
               <a:t> </a:t>
             </a:r>
             <a:r>
-              <a:rPr lang="it-IT" sz="1400" i="1" dirty="0" err="1"/>
+              <a:rPr lang="it-IT" sz="1400" i="1" dirty="0" err="1">
+                <a:latin typeface="+mj-lt"/>
+              </a:rPr>
               <a:t>Letters</a:t>
             </a:r>
             <a:r>
-              <a:rPr lang="it-IT" sz="1400" dirty="0"/>
+              <a:rPr lang="it-IT" sz="1400" dirty="0">
+                <a:latin typeface="+mj-lt"/>
+              </a:rPr>
               <a:t>, 2013.</a:t>
             </a:r>
           </a:p>
@@ -7678,7 +7822,9 @@
           <a:p>
             <a:pPr algn="ctr"/>
             <a:r>
-              <a:rPr lang="it-IT" sz="3200" b="1" dirty="0"/>
+              <a:rPr lang="it-IT" sz="3200" b="1" dirty="0">
+                <a:latin typeface="+mj-lt"/>
+              </a:rPr>
               <a:t>OPPORTUNITY DATASET</a:t>
             </a:r>
           </a:p>
@@ -7800,23 +7946,33 @@
               <a:buChar char="•"/>
             </a:pPr>
             <a:r>
-              <a:rPr lang="it-IT" sz="2400" dirty="0"/>
+              <a:rPr lang="it-IT" sz="2400" dirty="0">
+                <a:latin typeface="+mj-lt"/>
+              </a:rPr>
               <a:t>4 </a:t>
             </a:r>
             <a:r>
-              <a:rPr lang="it-IT" sz="2400" dirty="0" err="1"/>
+              <a:rPr lang="it-IT" sz="2400" dirty="0" err="1">
+                <a:latin typeface="+mj-lt"/>
+              </a:rPr>
               <a:t>different</a:t>
             </a:r>
             <a:r>
-              <a:rPr lang="it-IT" sz="2400" dirty="0"/>
+              <a:rPr lang="it-IT" sz="2400" dirty="0">
+                <a:latin typeface="+mj-lt"/>
+              </a:rPr>
               <a:t> </a:t>
             </a:r>
             <a:r>
-              <a:rPr lang="it-IT" sz="2400" dirty="0" err="1"/>
+              <a:rPr lang="it-IT" sz="2400" dirty="0" err="1">
+                <a:latin typeface="+mj-lt"/>
+              </a:rPr>
               <a:t>subjects</a:t>
             </a:r>
             <a:r>
-              <a:rPr lang="it-IT" sz="2400" dirty="0"/>
+              <a:rPr lang="it-IT" sz="2400" dirty="0">
+                <a:latin typeface="+mj-lt"/>
+              </a:rPr>
               <a:t> </a:t>
             </a:r>
           </a:p>
@@ -7826,31 +7982,45 @@
               <a:buChar char="•"/>
             </a:pPr>
             <a:r>
-              <a:rPr lang="it-IT" sz="2400" dirty="0"/>
+              <a:rPr lang="it-IT" sz="2400" dirty="0">
+                <a:latin typeface="+mj-lt"/>
+              </a:rPr>
               <a:t>7 </a:t>
             </a:r>
             <a:r>
-              <a:rPr lang="it-IT" sz="2400" dirty="0" err="1"/>
+              <a:rPr lang="it-IT" sz="2400" dirty="0" err="1">
+                <a:latin typeface="+mj-lt"/>
+              </a:rPr>
               <a:t>Inertial</a:t>
             </a:r>
             <a:r>
-              <a:rPr lang="it-IT" sz="2400" dirty="0"/>
+              <a:rPr lang="it-IT" sz="2400" dirty="0">
+                <a:latin typeface="+mj-lt"/>
+              </a:rPr>
               <a:t> </a:t>
             </a:r>
             <a:r>
-              <a:rPr lang="it-IT" sz="2400" dirty="0" err="1"/>
+              <a:rPr lang="it-IT" sz="2400" dirty="0" err="1">
+                <a:latin typeface="+mj-lt"/>
+              </a:rPr>
               <a:t>Measurement</a:t>
             </a:r>
             <a:r>
-              <a:rPr lang="it-IT" sz="2400" dirty="0"/>
+              <a:rPr lang="it-IT" sz="2400" dirty="0">
+                <a:latin typeface="+mj-lt"/>
+              </a:rPr>
               <a:t> </a:t>
             </a:r>
             <a:r>
-              <a:rPr lang="it-IT" sz="2400" dirty="0" err="1"/>
+              <a:rPr lang="it-IT" sz="2400" dirty="0" err="1">
+                <a:latin typeface="+mj-lt"/>
+              </a:rPr>
               <a:t>Units</a:t>
             </a:r>
             <a:r>
-              <a:rPr lang="it-IT" sz="2400" dirty="0"/>
+              <a:rPr lang="it-IT" sz="2400" dirty="0">
+                <a:latin typeface="+mj-lt"/>
+              </a:rPr>
               <a:t> </a:t>
             </a:r>
           </a:p>
@@ -7860,23 +8030,33 @@
               <a:buChar char="•"/>
             </a:pPr>
             <a:r>
-              <a:rPr lang="it-IT" sz="2400" dirty="0"/>
+              <a:rPr lang="it-IT" sz="2400" dirty="0">
+                <a:latin typeface="+mj-lt"/>
+              </a:rPr>
               <a:t>12 </a:t>
             </a:r>
             <a:r>
-              <a:rPr lang="it-IT" sz="2400" dirty="0" err="1"/>
+              <a:rPr lang="it-IT" sz="2400" dirty="0" err="1">
+                <a:latin typeface="+mj-lt"/>
+              </a:rPr>
               <a:t>accelerometer</a:t>
             </a:r>
             <a:r>
-              <a:rPr lang="it-IT" sz="2400" dirty="0"/>
+              <a:rPr lang="it-IT" sz="2400" dirty="0">
+                <a:latin typeface="+mj-lt"/>
+              </a:rPr>
               <a:t> </a:t>
             </a:r>
             <a:r>
-              <a:rPr lang="it-IT" sz="2400" dirty="0" err="1"/>
+              <a:rPr lang="it-IT" sz="2400" dirty="0" err="1">
+                <a:latin typeface="+mj-lt"/>
+              </a:rPr>
               <a:t>sensors</a:t>
             </a:r>
             <a:r>
-              <a:rPr lang="it-IT" sz="2400" dirty="0"/>
+              <a:rPr lang="it-IT" sz="2400" dirty="0">
+                <a:latin typeface="+mj-lt"/>
+              </a:rPr>
               <a:t> </a:t>
             </a:r>
           </a:p>
@@ -7948,23 +8128,33 @@
           <a:lstStyle/>
           <a:p>
             <a:r>
-              <a:rPr lang="it-IT" sz="2400" dirty="0"/>
+              <a:rPr lang="it-IT" sz="2400" dirty="0">
+                <a:latin typeface="+mj-lt"/>
+              </a:rPr>
               <a:t>113 </a:t>
             </a:r>
             <a:r>
-              <a:rPr lang="it-IT" sz="2400" dirty="0" err="1"/>
+              <a:rPr lang="it-IT" sz="2400" dirty="0" err="1">
+                <a:latin typeface="+mj-lt"/>
+              </a:rPr>
               <a:t>channels</a:t>
             </a:r>
             <a:r>
-              <a:rPr lang="it-IT" sz="2400" dirty="0"/>
+              <a:rPr lang="it-IT" sz="2400" dirty="0">
+                <a:latin typeface="+mj-lt"/>
+              </a:rPr>
               <a:t> of </a:t>
             </a:r>
             <a:r>
-              <a:rPr lang="it-IT" sz="2400" dirty="0" err="1"/>
+              <a:rPr lang="it-IT" sz="2400" dirty="0" err="1">
+                <a:latin typeface="+mj-lt"/>
+              </a:rPr>
               <a:t>measurements</a:t>
             </a:r>
             <a:r>
-              <a:rPr lang="it-IT" sz="2400" dirty="0"/>
+              <a:rPr lang="it-IT" sz="2400" dirty="0">
+                <a:latin typeface="+mj-lt"/>
+              </a:rPr>
               <a:t> </a:t>
             </a:r>
           </a:p>
@@ -7993,55 +8183,81 @@
           <a:lstStyle/>
           <a:p>
             <a:r>
-              <a:rPr lang="it-IT" sz="2400" dirty="0"/>
+              <a:rPr lang="it-IT" sz="2400" dirty="0">
+                <a:latin typeface="+mj-lt"/>
+              </a:rPr>
               <a:t>Data </a:t>
             </a:r>
             <a:r>
-              <a:rPr lang="it-IT" sz="2400" dirty="0" err="1"/>
+              <a:rPr lang="it-IT" sz="2400" dirty="0" err="1">
+                <a:latin typeface="+mj-lt"/>
+              </a:rPr>
               <a:t>has</a:t>
             </a:r>
             <a:r>
-              <a:rPr lang="it-IT" sz="2400" dirty="0"/>
+              <a:rPr lang="it-IT" sz="2400" dirty="0">
+                <a:latin typeface="+mj-lt"/>
+              </a:rPr>
               <a:t> </a:t>
             </a:r>
             <a:r>
-              <a:rPr lang="it-IT" sz="2400" dirty="0" err="1"/>
+              <a:rPr lang="it-IT" sz="2400" dirty="0" err="1">
+                <a:latin typeface="+mj-lt"/>
+              </a:rPr>
               <a:t>been</a:t>
             </a:r>
             <a:r>
-              <a:rPr lang="it-IT" sz="2400" dirty="0"/>
+              <a:rPr lang="it-IT" sz="2400" dirty="0">
+                <a:latin typeface="+mj-lt"/>
+              </a:rPr>
               <a:t> </a:t>
             </a:r>
             <a:r>
-              <a:rPr lang="it-IT" sz="2400" dirty="0" err="1"/>
+              <a:rPr lang="it-IT" sz="2400" dirty="0" err="1">
+                <a:latin typeface="+mj-lt"/>
+              </a:rPr>
               <a:t>collected</a:t>
             </a:r>
             <a:r>
-              <a:rPr lang="it-IT" sz="2400" dirty="0"/>
+              <a:rPr lang="it-IT" sz="2400" dirty="0">
+                <a:latin typeface="+mj-lt"/>
+              </a:rPr>
               <a:t> in </a:t>
             </a:r>
             <a:r>
-              <a:rPr lang="it-IT" sz="2400" dirty="0" err="1"/>
+              <a:rPr lang="it-IT" sz="2400" dirty="0" err="1">
+                <a:latin typeface="+mj-lt"/>
+              </a:rPr>
               <a:t>two</a:t>
             </a:r>
             <a:r>
-              <a:rPr lang="it-IT" sz="2400" dirty="0"/>
+              <a:rPr lang="it-IT" sz="2400" dirty="0">
+                <a:latin typeface="+mj-lt"/>
+              </a:rPr>
               <a:t> </a:t>
             </a:r>
             <a:r>
-              <a:rPr lang="it-IT" sz="2400" dirty="0" err="1"/>
+              <a:rPr lang="it-IT" sz="2400" dirty="0" err="1">
+                <a:latin typeface="+mj-lt"/>
+              </a:rPr>
               <a:t>distinct</a:t>
             </a:r>
             <a:r>
-              <a:rPr lang="it-IT" sz="2400" dirty="0"/>
+              <a:rPr lang="it-IT" sz="2400" dirty="0">
+                <a:latin typeface="+mj-lt"/>
+              </a:rPr>
               <a:t> </a:t>
             </a:r>
             <a:r>
-              <a:rPr lang="it-IT" sz="2400" dirty="0" err="1"/>
+              <a:rPr lang="it-IT" sz="2400" dirty="0" err="1">
+                <a:latin typeface="+mj-lt"/>
+              </a:rPr>
               <a:t>modalities</a:t>
             </a:r>
             <a:r>
-              <a:rPr lang="it-IT" sz="2400" dirty="0"/>
+              <a:rPr lang="it-IT" sz="2400" dirty="0">
+                <a:latin typeface="+mj-lt"/>
+              </a:rPr>
               <a:t> :</a:t>
             </a:r>
           </a:p>
@@ -8051,23 +8267,33 @@
               <a:buChar char="•"/>
             </a:pPr>
             <a:r>
-              <a:rPr lang="it-IT" sz="2400" dirty="0"/>
+              <a:rPr lang="it-IT" sz="2400" dirty="0">
+                <a:latin typeface="+mj-lt"/>
+              </a:rPr>
               <a:t>5 sessions of  </a:t>
             </a:r>
             <a:r>
-              <a:rPr lang="it-IT" sz="2400" b="1" dirty="0"/>
+              <a:rPr lang="it-IT" sz="2400" b="1" dirty="0">
+                <a:latin typeface="+mj-lt"/>
+              </a:rPr>
               <a:t>Activity of </a:t>
             </a:r>
             <a:r>
-              <a:rPr lang="it-IT" sz="2400" b="1" dirty="0" err="1"/>
+              <a:rPr lang="it-IT" sz="2400" b="1" dirty="0" err="1">
+                <a:latin typeface="+mj-lt"/>
+              </a:rPr>
               <a:t>Daily</a:t>
             </a:r>
             <a:r>
-              <a:rPr lang="it-IT" sz="2400" b="1" dirty="0"/>
+              <a:rPr lang="it-IT" sz="2400" b="1" dirty="0">
+                <a:latin typeface="+mj-lt"/>
+              </a:rPr>
               <a:t> Living </a:t>
             </a:r>
             <a:r>
-              <a:rPr lang="it-IT" sz="2400" dirty="0"/>
+              <a:rPr lang="it-IT" sz="2400" dirty="0">
+                <a:latin typeface="+mj-lt"/>
+              </a:rPr>
               <a:t>(ADL)</a:t>
             </a:r>
           </a:p>
@@ -8077,46 +8303,68 @@
               <a:buChar char="•"/>
             </a:pPr>
             <a:r>
-              <a:rPr lang="it-IT" sz="2400" b="1" dirty="0" err="1"/>
+              <a:rPr lang="it-IT" sz="2400" b="1" dirty="0" err="1">
+                <a:latin typeface="+mj-lt"/>
+              </a:rPr>
               <a:t>Drill</a:t>
             </a:r>
             <a:r>
-              <a:rPr lang="it-IT" sz="2400" b="1" dirty="0"/>
+              <a:rPr lang="it-IT" sz="2400" b="1" dirty="0">
+                <a:latin typeface="+mj-lt"/>
+              </a:rPr>
               <a:t> </a:t>
             </a:r>
             <a:r>
-              <a:rPr lang="it-IT" sz="2400" dirty="0"/>
+              <a:rPr lang="it-IT" sz="2400" dirty="0">
+                <a:latin typeface="+mj-lt"/>
+              </a:rPr>
               <a:t>: 20 </a:t>
             </a:r>
             <a:r>
-              <a:rPr lang="it-IT" sz="2400" dirty="0" err="1"/>
+              <a:rPr lang="it-IT" sz="2400" dirty="0" err="1">
+                <a:latin typeface="+mj-lt"/>
+              </a:rPr>
               <a:t>repetitions</a:t>
             </a:r>
             <a:r>
-              <a:rPr lang="it-IT" sz="2400" dirty="0"/>
+              <a:rPr lang="it-IT" sz="2400" dirty="0">
+                <a:latin typeface="+mj-lt"/>
+              </a:rPr>
               <a:t> of </a:t>
             </a:r>
             <a:r>
-              <a:rPr lang="it-IT" sz="2400" dirty="0" err="1"/>
+              <a:rPr lang="it-IT" sz="2400" dirty="0" err="1">
+                <a:latin typeface="+mj-lt"/>
+              </a:rPr>
               <a:t>low</a:t>
             </a:r>
             <a:r>
-              <a:rPr lang="it-IT" sz="2400" dirty="0"/>
+              <a:rPr lang="it-IT" sz="2400" dirty="0">
+                <a:latin typeface="+mj-lt"/>
+              </a:rPr>
               <a:t> </a:t>
             </a:r>
             <a:r>
-              <a:rPr lang="it-IT" sz="2400" dirty="0" err="1"/>
+              <a:rPr lang="it-IT" sz="2400" dirty="0" err="1">
+                <a:latin typeface="+mj-lt"/>
+              </a:rPr>
               <a:t>level</a:t>
             </a:r>
             <a:r>
-              <a:rPr lang="it-IT" sz="2400" dirty="0"/>
+              <a:rPr lang="it-IT" sz="2400" dirty="0">
+                <a:latin typeface="+mj-lt"/>
+              </a:rPr>
               <a:t> </a:t>
             </a:r>
             <a:r>
-              <a:rPr lang="it-IT" sz="2400" dirty="0" err="1"/>
+              <a:rPr lang="it-IT" sz="2400" dirty="0" err="1">
+                <a:latin typeface="+mj-lt"/>
+              </a:rPr>
               <a:t>activities</a:t>
             </a:r>
-            <a:endParaRPr lang="it-IT" sz="2400" b="1" dirty="0"/>
+            <a:endParaRPr lang="it-IT" sz="2400" b="1" dirty="0">
+              <a:latin typeface="+mj-lt"/>
+            </a:endParaRPr>
           </a:p>
         </p:txBody>
       </p:sp>
@@ -8160,12 +8408,37 @@
             <p:ph type="title"/>
           </p:nvPr>
         </p:nvSpPr>
-        <p:spPr/>
-        <p:txBody>
-          <a:bodyPr/>
-          <a:lstStyle/>
-          <a:p>
-            <a:endParaRPr lang="it-IT"/>
+        <p:spPr>
+          <a:xfrm>
+            <a:off x="628650" y="285612"/>
+            <a:ext cx="7886700" cy="1325563"/>
+          </a:xfrm>
+        </p:spPr>
+        <p:txBody>
+          <a:bodyPr/>
+          <a:lstStyle/>
+          <a:p>
+            <a:r>
+              <a:rPr lang="it-IT" b="1" dirty="0" err="1"/>
+              <a:t>Multiclass</a:t>
+            </a:r>
+            <a:r>
+              <a:rPr lang="it-IT" b="1" dirty="0"/>
+              <a:t> </a:t>
+            </a:r>
+            <a:r>
+              <a:rPr lang="it-IT" b="1" dirty="0" err="1"/>
+              <a:t>Classification</a:t>
+            </a:r>
+            <a:r>
+              <a:rPr lang="it-IT" b="1" dirty="0"/>
+              <a:t> </a:t>
+            </a:r>
+            <a:r>
+              <a:rPr lang="it-IT" b="1" dirty="0" err="1"/>
+              <a:t>Problem</a:t>
+            </a:r>
+            <a:endParaRPr lang="it-IT" b="1" dirty="0"/>
           </a:p>
         </p:txBody>
       </p:sp>
@@ -8179,12 +8452,494 @@
             <p:ph idx="1"/>
           </p:nvPr>
         </p:nvSpPr>
-        <p:spPr/>
-        <p:txBody>
-          <a:bodyPr/>
-          <a:lstStyle/>
-          <a:p>
-            <a:endParaRPr lang="it-IT" dirty="0"/>
+        <p:spPr>
+          <a:xfrm>
+            <a:off x="837372" y="1611175"/>
+            <a:ext cx="7886700" cy="4351338"/>
+          </a:xfrm>
+        </p:spPr>
+        <p:txBody>
+          <a:bodyPr/>
+          <a:lstStyle/>
+          <a:p>
+            <a:pPr marL="0" indent="0">
+              <a:buNone/>
+            </a:pPr>
+            <a:r>
+              <a:rPr lang="it-IT" b="1" dirty="0">
+                <a:latin typeface="+mj-lt"/>
+              </a:rPr>
+              <a:t>TASK A:</a:t>
+            </a:r>
+          </a:p>
+          <a:p>
+            <a:r>
+              <a:rPr lang="it-IT" b="1" dirty="0" err="1">
+                <a:latin typeface="+mj-lt"/>
+              </a:rPr>
+              <a:t>Classification</a:t>
+            </a:r>
+            <a:r>
+              <a:rPr lang="it-IT" b="1" dirty="0">
+                <a:latin typeface="+mj-lt"/>
+              </a:rPr>
+              <a:t> of high </a:t>
+            </a:r>
+            <a:r>
+              <a:rPr lang="it-IT" b="1" dirty="0" err="1">
+                <a:latin typeface="+mj-lt"/>
+              </a:rPr>
+              <a:t>level</a:t>
+            </a:r>
+            <a:r>
+              <a:rPr lang="it-IT" b="1" dirty="0">
+                <a:latin typeface="+mj-lt"/>
+              </a:rPr>
+              <a:t> </a:t>
+            </a:r>
+            <a:r>
+              <a:rPr lang="it-IT" b="1" dirty="0" err="1">
+                <a:latin typeface="+mj-lt"/>
+              </a:rPr>
+              <a:t>gestures</a:t>
+            </a:r>
+            <a:r>
+              <a:rPr lang="it-IT" b="1" dirty="0">
+                <a:latin typeface="+mj-lt"/>
+              </a:rPr>
+              <a:t> / </a:t>
+            </a:r>
+            <a:r>
+              <a:rPr lang="it-IT" b="1" dirty="0" err="1">
+                <a:latin typeface="+mj-lt"/>
+              </a:rPr>
+              <a:t>modes</a:t>
+            </a:r>
+            <a:r>
+              <a:rPr lang="it-IT" b="1" dirty="0">
+                <a:latin typeface="+mj-lt"/>
+              </a:rPr>
+              <a:t> of </a:t>
+            </a:r>
+            <a:r>
+              <a:rPr lang="it-IT" b="1" dirty="0" err="1">
+                <a:latin typeface="+mj-lt"/>
+              </a:rPr>
+              <a:t>locomotion</a:t>
+            </a:r>
+            <a:endParaRPr lang="it-IT" b="1" dirty="0">
+              <a:latin typeface="+mj-lt"/>
+            </a:endParaRPr>
+          </a:p>
+          <a:p>
+            <a:pPr marL="0" indent="0">
+              <a:buNone/>
+            </a:pPr>
+            <a:r>
+              <a:rPr lang="it-IT" sz="2400" b="1" i="1" dirty="0">
+                <a:latin typeface="+mj-lt"/>
+              </a:rPr>
+              <a:t>Standing, </a:t>
+            </a:r>
+            <a:r>
+              <a:rPr lang="it-IT" sz="2400" b="1" i="1" dirty="0" err="1">
+                <a:latin typeface="+mj-lt"/>
+              </a:rPr>
+              <a:t>Walking</a:t>
+            </a:r>
+            <a:r>
+              <a:rPr lang="it-IT" sz="2400" b="1" i="1" dirty="0">
+                <a:latin typeface="+mj-lt"/>
+              </a:rPr>
+              <a:t>, </a:t>
+            </a:r>
+            <a:r>
+              <a:rPr lang="it-IT" sz="2400" b="1" i="1" dirty="0" err="1">
+                <a:latin typeface="+mj-lt"/>
+              </a:rPr>
+              <a:t>Lying</a:t>
+            </a:r>
+            <a:r>
+              <a:rPr lang="it-IT" sz="2400" b="1" i="1" dirty="0">
+                <a:latin typeface="+mj-lt"/>
+              </a:rPr>
+              <a:t>, </a:t>
+            </a:r>
+            <a:r>
+              <a:rPr lang="it-IT" sz="2400" b="1" i="1" dirty="0" err="1">
+                <a:latin typeface="+mj-lt"/>
+              </a:rPr>
+              <a:t>Sitting</a:t>
+            </a:r>
+            <a:endParaRPr lang="it-IT" sz="2400" b="1" i="1" dirty="0">
+              <a:latin typeface="+mj-lt"/>
+            </a:endParaRPr>
+          </a:p>
+          <a:p>
+            <a:pPr marL="0" indent="0">
+              <a:buNone/>
+            </a:pPr>
+            <a:endParaRPr lang="it-IT" sz="2400" b="1" dirty="0">
+              <a:latin typeface="+mj-lt"/>
+            </a:endParaRPr>
+          </a:p>
+          <a:p>
+            <a:pPr marL="0" indent="0">
+              <a:buNone/>
+            </a:pPr>
+            <a:r>
+              <a:rPr lang="it-IT" b="1" dirty="0">
+                <a:latin typeface="+mj-lt"/>
+              </a:rPr>
+              <a:t>TASK B:</a:t>
+            </a:r>
+          </a:p>
+          <a:p>
+            <a:r>
+              <a:rPr lang="it-IT" b="1" dirty="0" err="1">
+                <a:latin typeface="+mj-lt"/>
+              </a:rPr>
+              <a:t>Recognition</a:t>
+            </a:r>
+            <a:r>
+              <a:rPr lang="it-IT" b="1" dirty="0">
+                <a:latin typeface="+mj-lt"/>
+              </a:rPr>
+              <a:t> of </a:t>
+            </a:r>
+            <a:r>
+              <a:rPr lang="it-IT" b="1" dirty="0" err="1">
+                <a:latin typeface="+mj-lt"/>
+              </a:rPr>
+              <a:t>low</a:t>
+            </a:r>
+            <a:r>
+              <a:rPr lang="it-IT" b="1" dirty="0">
+                <a:latin typeface="+mj-lt"/>
+              </a:rPr>
+              <a:t> </a:t>
+            </a:r>
+            <a:r>
+              <a:rPr lang="it-IT" b="1" dirty="0" err="1">
+                <a:latin typeface="+mj-lt"/>
+              </a:rPr>
+              <a:t>level</a:t>
+            </a:r>
+            <a:r>
+              <a:rPr lang="it-IT" b="1" dirty="0">
+                <a:latin typeface="+mj-lt"/>
+              </a:rPr>
+              <a:t> </a:t>
+            </a:r>
+            <a:r>
+              <a:rPr lang="it-IT" b="1" dirty="0" err="1">
+                <a:latin typeface="+mj-lt"/>
+              </a:rPr>
+              <a:t>gestures</a:t>
+            </a:r>
+            <a:r>
+              <a:rPr lang="it-IT" b="1" dirty="0">
+                <a:latin typeface="+mj-lt"/>
+              </a:rPr>
+              <a:t> </a:t>
+            </a:r>
+            <a:r>
+              <a:rPr lang="it-IT" sz="1800" b="1" dirty="0">
+                <a:latin typeface="+mj-lt"/>
+              </a:rPr>
+              <a:t>(17 in </a:t>
+            </a:r>
+            <a:r>
+              <a:rPr lang="it-IT" sz="1800" b="1" dirty="0" err="1">
+                <a:latin typeface="+mj-lt"/>
+              </a:rPr>
+              <a:t>total</a:t>
+            </a:r>
+            <a:r>
+              <a:rPr lang="it-IT" sz="1800" b="1" dirty="0">
+                <a:latin typeface="+mj-lt"/>
+              </a:rPr>
+              <a:t>)</a:t>
+            </a:r>
+          </a:p>
+          <a:p>
+            <a:pPr marL="0" indent="0">
+              <a:buNone/>
+            </a:pPr>
+            <a:r>
+              <a:rPr lang="it-IT" sz="2400" b="1" i="1" dirty="0">
+                <a:latin typeface="+mj-lt"/>
+              </a:rPr>
+              <a:t>Open </a:t>
+            </a:r>
+            <a:r>
+              <a:rPr lang="it-IT" sz="2400" b="1" i="1" dirty="0" err="1">
+                <a:latin typeface="+mj-lt"/>
+              </a:rPr>
+              <a:t>Dishwasher</a:t>
+            </a:r>
+            <a:r>
+              <a:rPr lang="it-IT" sz="2400" b="1" i="1" dirty="0">
+                <a:latin typeface="+mj-lt"/>
+              </a:rPr>
+              <a:t>, Close </a:t>
+            </a:r>
+            <a:r>
+              <a:rPr lang="it-IT" sz="2400" b="1" i="1" dirty="0" err="1">
+                <a:latin typeface="+mj-lt"/>
+              </a:rPr>
+              <a:t>Dishwasher</a:t>
+            </a:r>
+            <a:r>
+              <a:rPr lang="it-IT" sz="2400" b="1" i="1" dirty="0">
+                <a:latin typeface="+mj-lt"/>
+              </a:rPr>
+              <a:t>, Open </a:t>
+            </a:r>
+            <a:r>
+              <a:rPr lang="it-IT" sz="2400" b="1" i="1" dirty="0" err="1">
+                <a:latin typeface="+mj-lt"/>
+              </a:rPr>
+              <a:t>Fridge</a:t>
+            </a:r>
+            <a:r>
+              <a:rPr lang="it-IT" sz="2400" b="1" i="1" dirty="0">
+                <a:latin typeface="+mj-lt"/>
+              </a:rPr>
+              <a:t>, Close </a:t>
+            </a:r>
+            <a:r>
+              <a:rPr lang="it-IT" sz="2400" b="1" i="1" dirty="0" err="1">
+                <a:latin typeface="+mj-lt"/>
+              </a:rPr>
+              <a:t>Fridge</a:t>
+            </a:r>
+            <a:r>
+              <a:rPr lang="it-IT" sz="2400" b="1" i="1" dirty="0">
+                <a:latin typeface="+mj-lt"/>
+              </a:rPr>
+              <a:t>,</a:t>
+            </a:r>
+          </a:p>
+          <a:p>
+            <a:pPr marL="0" indent="0">
+              <a:buNone/>
+            </a:pPr>
+            <a:r>
+              <a:rPr lang="it-IT" sz="2400" b="1" i="1" dirty="0">
+                <a:latin typeface="+mj-lt"/>
+              </a:rPr>
+              <a:t>Open </a:t>
+            </a:r>
+            <a:r>
+              <a:rPr lang="it-IT" sz="2400" b="1" i="1" dirty="0" err="1">
+                <a:latin typeface="+mj-lt"/>
+              </a:rPr>
+              <a:t>Drawer</a:t>
+            </a:r>
+            <a:r>
+              <a:rPr lang="it-IT" sz="2400" b="1" i="1" dirty="0">
+                <a:latin typeface="+mj-lt"/>
+              </a:rPr>
+              <a:t> 1, Close </a:t>
+            </a:r>
+            <a:r>
+              <a:rPr lang="it-IT" sz="2400" b="1" i="1" dirty="0" err="1">
+                <a:latin typeface="+mj-lt"/>
+              </a:rPr>
+              <a:t>Drawer</a:t>
+            </a:r>
+            <a:r>
+              <a:rPr lang="it-IT" sz="2400" b="1" i="1" dirty="0">
+                <a:latin typeface="+mj-lt"/>
+              </a:rPr>
+              <a:t> 1, Open Door 1, Close Door 1, …</a:t>
+            </a:r>
+          </a:p>
+          <a:p>
+            <a:endParaRPr lang="it-IT" b="1" dirty="0">
+              <a:latin typeface="+mj-lt"/>
+            </a:endParaRPr>
+          </a:p>
+        </p:txBody>
+      </p:sp>
+      <p:sp>
+        <p:nvSpPr>
+          <p:cNvPr id="4" name="CasellaDiTesto 3"/>
+          <p:cNvSpPr txBox="1"/>
+          <p:nvPr/>
+        </p:nvSpPr>
+        <p:spPr>
+          <a:xfrm>
+            <a:off x="728041" y="6033052"/>
+            <a:ext cx="6358600" cy="646331"/>
+          </a:xfrm>
+          <a:prstGeom prst="rect">
+            <a:avLst/>
+          </a:prstGeom>
+          <a:noFill/>
+        </p:spPr>
+        <p:txBody>
+          <a:bodyPr wrap="none" rtlCol="0">
+            <a:spAutoFit/>
+          </a:bodyPr>
+          <a:lstStyle/>
+          <a:p>
+            <a:r>
+              <a:rPr lang="it-IT" dirty="0" err="1">
+                <a:latin typeface="+mj-lt"/>
+              </a:rPr>
+              <a:t>Both</a:t>
+            </a:r>
+            <a:r>
+              <a:rPr lang="it-IT" dirty="0">
+                <a:latin typeface="+mj-lt"/>
+              </a:rPr>
+              <a:t> </a:t>
+            </a:r>
+            <a:r>
+              <a:rPr lang="it-IT" dirty="0" err="1">
+                <a:latin typeface="+mj-lt"/>
+              </a:rPr>
+              <a:t>tasks</a:t>
+            </a:r>
+            <a:r>
+              <a:rPr lang="it-IT" dirty="0">
+                <a:latin typeface="+mj-lt"/>
+              </a:rPr>
+              <a:t> </a:t>
+            </a:r>
+            <a:r>
+              <a:rPr lang="it-IT" dirty="0" err="1">
+                <a:latin typeface="+mj-lt"/>
+              </a:rPr>
+              <a:t>comprehend</a:t>
+            </a:r>
+            <a:r>
+              <a:rPr lang="it-IT" dirty="0">
+                <a:latin typeface="+mj-lt"/>
+              </a:rPr>
+              <a:t> the </a:t>
+            </a:r>
+            <a:r>
+              <a:rPr lang="it-IT" i="1" dirty="0" err="1">
+                <a:latin typeface="+mj-lt"/>
+              </a:rPr>
+              <a:t>Null</a:t>
+            </a:r>
+            <a:r>
+              <a:rPr lang="it-IT" i="1" dirty="0">
+                <a:latin typeface="+mj-lt"/>
+              </a:rPr>
+              <a:t> Class</a:t>
+            </a:r>
+            <a:r>
+              <a:rPr lang="it-IT" dirty="0">
+                <a:latin typeface="+mj-lt"/>
+              </a:rPr>
+              <a:t>, </a:t>
+            </a:r>
+            <a:r>
+              <a:rPr lang="it-IT" dirty="0" err="1">
+                <a:latin typeface="+mj-lt"/>
+              </a:rPr>
+              <a:t>which</a:t>
+            </a:r>
+            <a:r>
+              <a:rPr lang="it-IT" dirty="0">
+                <a:latin typeface="+mj-lt"/>
+              </a:rPr>
+              <a:t> </a:t>
+            </a:r>
+            <a:r>
+              <a:rPr lang="it-IT" dirty="0" err="1">
+                <a:latin typeface="+mj-lt"/>
+              </a:rPr>
+              <a:t>represents</a:t>
+            </a:r>
+            <a:r>
+              <a:rPr lang="it-IT" dirty="0">
+                <a:latin typeface="+mj-lt"/>
+              </a:rPr>
+              <a:t> </a:t>
+            </a:r>
+            <a:r>
+              <a:rPr lang="it-IT" dirty="0" err="1">
+                <a:latin typeface="+mj-lt"/>
+              </a:rPr>
+              <a:t>inactivity</a:t>
+            </a:r>
+            <a:r>
+              <a:rPr lang="it-IT" dirty="0">
+                <a:latin typeface="+mj-lt"/>
+              </a:rPr>
+              <a:t>. </a:t>
+            </a:r>
+          </a:p>
+          <a:p>
+            <a:r>
+              <a:rPr lang="it-IT" dirty="0">
+                <a:latin typeface="+mj-lt"/>
+              </a:rPr>
+              <a:t>A more </a:t>
+            </a:r>
+            <a:r>
+              <a:rPr lang="it-IT" dirty="0" err="1">
+                <a:latin typeface="+mj-lt"/>
+              </a:rPr>
+              <a:t>detailed</a:t>
+            </a:r>
+            <a:r>
+              <a:rPr lang="it-IT" dirty="0">
+                <a:latin typeface="+mj-lt"/>
+              </a:rPr>
+              <a:t> </a:t>
+            </a:r>
+            <a:r>
+              <a:rPr lang="it-IT" dirty="0" err="1">
+                <a:latin typeface="+mj-lt"/>
+              </a:rPr>
+              <a:t>discussion</a:t>
+            </a:r>
+            <a:r>
+              <a:rPr lang="it-IT" dirty="0">
+                <a:latin typeface="+mj-lt"/>
+              </a:rPr>
+              <a:t> on </a:t>
+            </a:r>
+            <a:r>
+              <a:rPr lang="it-IT" dirty="0" err="1">
+                <a:latin typeface="+mj-lt"/>
+              </a:rPr>
+              <a:t>this</a:t>
+            </a:r>
+            <a:r>
+              <a:rPr lang="it-IT" dirty="0">
+                <a:latin typeface="+mj-lt"/>
+              </a:rPr>
+              <a:t> in a </a:t>
+            </a:r>
+            <a:r>
+              <a:rPr lang="it-IT" dirty="0" err="1">
+                <a:latin typeface="+mj-lt"/>
+              </a:rPr>
+              <a:t>couple</a:t>
+            </a:r>
+            <a:r>
+              <a:rPr lang="it-IT" dirty="0">
+                <a:latin typeface="+mj-lt"/>
+              </a:rPr>
+              <a:t> of </a:t>
+            </a:r>
+            <a:r>
+              <a:rPr lang="it-IT" dirty="0" err="1">
+                <a:latin typeface="+mj-lt"/>
+              </a:rPr>
+              <a:t>slides</a:t>
+            </a:r>
+            <a:endParaRPr lang="it-IT" dirty="0">
+              <a:latin typeface="+mj-lt"/>
+            </a:endParaRPr>
           </a:p>
         </p:txBody>
       </p:sp>
@@ -8220,6 +8975,77 @@
       </p:grpSpPr>
       <p:sp>
         <p:nvSpPr>
+          <p:cNvPr id="2" name="Titolo 1"/>
+          <p:cNvSpPr>
+            <a:spLocks noGrp="1"/>
+          </p:cNvSpPr>
+          <p:nvPr>
+            <p:ph type="title"/>
+          </p:nvPr>
+        </p:nvSpPr>
+        <p:spPr/>
+        <p:txBody>
+          <a:bodyPr/>
+          <a:lstStyle/>
+          <a:p>
+            <a:r>
+              <a:rPr lang="it-IT" dirty="0"/>
+              <a:t>State of the Art </a:t>
+            </a:r>
+          </a:p>
+        </p:txBody>
+      </p:sp>
+      <p:sp>
+        <p:nvSpPr>
+          <p:cNvPr id="3" name="Segnaposto contenuto 2"/>
+          <p:cNvSpPr>
+            <a:spLocks noGrp="1"/>
+          </p:cNvSpPr>
+          <p:nvPr>
+            <p:ph idx="1"/>
+          </p:nvPr>
+        </p:nvSpPr>
+        <p:spPr/>
+        <p:txBody>
+          <a:bodyPr/>
+          <a:lstStyle/>
+          <a:p>
+            <a:endParaRPr lang="it-IT" dirty="0"/>
+          </a:p>
+        </p:txBody>
+      </p:sp>
+    </p:spTree>
+    <p:extLst>
+      <p:ext uri="{BB962C8B-B14F-4D97-AF65-F5344CB8AC3E}">
+        <p14:creationId xmlns:p14="http://schemas.microsoft.com/office/powerpoint/2010/main" val="2280814564"/>
+      </p:ext>
+    </p:extLst>
+  </p:cSld>
+  <p:clrMapOvr>
+    <a:masterClrMapping/>
+  </p:clrMapOvr>
+</p:sld>
+</file>
+
+<file path=ppt/slides/slide8.xml><?xml version="1.0" encoding="utf-8"?>
+<p:sld xmlns:a="http://schemas.openxmlformats.org/drawingml/2006/main" xmlns:r="http://schemas.openxmlformats.org/officeDocument/2006/relationships" xmlns:p="http://schemas.openxmlformats.org/presentationml/2006/main">
+  <p:cSld>
+    <p:spTree>
+      <p:nvGrpSpPr>
+        <p:cNvPr id="1" name=""/>
+        <p:cNvGrpSpPr/>
+        <p:nvPr/>
+      </p:nvGrpSpPr>
+      <p:grpSpPr>
+        <a:xfrm>
+          <a:off x="0" y="0"/>
+          <a:ext cx="0" cy="0"/>
+          <a:chOff x="0" y="0"/>
+          <a:chExt cx="0" cy="0"/>
+        </a:xfrm>
+      </p:grpSpPr>
+      <p:sp>
+        <p:nvSpPr>
           <p:cNvPr id="10" name="Titolo 9"/>
           <p:cNvSpPr>
             <a:spLocks noGrp="1"/>
@@ -8344,7 +9170,7 @@
 </p:sld>
 </file>
 
-<file path=ppt/slides/slide8.xml><?xml version="1.0" encoding="utf-8"?>
+<file path=ppt/slides/slide9.xml><?xml version="1.0" encoding="utf-8"?>
 <p:sld xmlns:a="http://schemas.openxmlformats.org/drawingml/2006/main" xmlns:r="http://schemas.openxmlformats.org/officeDocument/2006/relationships" xmlns:p="http://schemas.openxmlformats.org/presentationml/2006/main">
   <p:cSld>
     <p:bg>
@@ -8405,7 +9231,6 @@
                     </a:srgbClr>
                   </a:outerShdw>
                 </a:effectLst>
-                <a:latin typeface="+mn-lt"/>
                 <a:ea typeface="Fira Sans" charset="0"/>
                 <a:cs typeface="Fira Sans" charset="0"/>
               </a:rPr>
@@ -8690,7 +9515,7 @@
     </p:spTree>
     <p:extLst>
       <p:ext uri="{BB962C8B-B14F-4D97-AF65-F5344CB8AC3E}">
-        <p14:creationId xmlns:p14="http://schemas.microsoft.com/office/powerpoint/2010/main" val="2348398944"/>
+        <p14:creationId xmlns:p14="http://schemas.microsoft.com/office/powerpoint/2010/main" val="940851349"/>
       </p:ext>
     </p:extLst>
   </p:cSld>

</xml_diff>